<commit_message>
Mandibles phylogeny, fixed paper introduction, re-wrote paper discussion, re-named references file
</commit_message>
<xml_diff>
--- a/Disparity/output/shape_data/FourPlotPCA.pptx
+++ b/Disparity/output/shape_data/FourPlotPCA.pptx
@@ -5,7 +5,7 @@
     <p:sldMasterId id="2147483648" r:id="rId1"/>
   </p:sldMasterIdLst>
   <p:sldIdLst>
-    <p:sldId id="256" r:id="rId2"/>
+    <p:sldId id="257" r:id="rId2"/>
   </p:sldIdLst>
   <p:sldSz cx="9144000" cy="6858000" type="screen4x3"/>
   <p:notesSz cx="6858000" cy="9144000"/>
@@ -288,7 +288,7 @@
           <a:p>
             <a:fld id="{9FE61444-4E6E-4CEE-8736-B00447B90B41}" type="datetimeFigureOut">
               <a:rPr lang="en-IE" smtClean="0"/>
-              <a:t>25/07/2014</a:t>
+              <a:t>01/08/2014</a:t>
             </a:fld>
             <a:endParaRPr lang="en-IE"/>
           </a:p>
@@ -458,7 +458,7 @@
           <a:p>
             <a:fld id="{9FE61444-4E6E-4CEE-8736-B00447B90B41}" type="datetimeFigureOut">
               <a:rPr lang="en-IE" smtClean="0"/>
-              <a:t>25/07/2014</a:t>
+              <a:t>01/08/2014</a:t>
             </a:fld>
             <a:endParaRPr lang="en-IE"/>
           </a:p>
@@ -638,7 +638,7 @@
           <a:p>
             <a:fld id="{9FE61444-4E6E-4CEE-8736-B00447B90B41}" type="datetimeFigureOut">
               <a:rPr lang="en-IE" smtClean="0"/>
-              <a:t>25/07/2014</a:t>
+              <a:t>01/08/2014</a:t>
             </a:fld>
             <a:endParaRPr lang="en-IE"/>
           </a:p>
@@ -808,7 +808,7 @@
           <a:p>
             <a:fld id="{9FE61444-4E6E-4CEE-8736-B00447B90B41}" type="datetimeFigureOut">
               <a:rPr lang="en-IE" smtClean="0"/>
-              <a:t>25/07/2014</a:t>
+              <a:t>01/08/2014</a:t>
             </a:fld>
             <a:endParaRPr lang="en-IE"/>
           </a:p>
@@ -1054,7 +1054,7 @@
           <a:p>
             <a:fld id="{9FE61444-4E6E-4CEE-8736-B00447B90B41}" type="datetimeFigureOut">
               <a:rPr lang="en-IE" smtClean="0"/>
-              <a:t>25/07/2014</a:t>
+              <a:t>01/08/2014</a:t>
             </a:fld>
             <a:endParaRPr lang="en-IE"/>
           </a:p>
@@ -1342,7 +1342,7 @@
           <a:p>
             <a:fld id="{9FE61444-4E6E-4CEE-8736-B00447B90B41}" type="datetimeFigureOut">
               <a:rPr lang="en-IE" smtClean="0"/>
-              <a:t>25/07/2014</a:t>
+              <a:t>01/08/2014</a:t>
             </a:fld>
             <a:endParaRPr lang="en-IE"/>
           </a:p>
@@ -1764,7 +1764,7 @@
           <a:p>
             <a:fld id="{9FE61444-4E6E-4CEE-8736-B00447B90B41}" type="datetimeFigureOut">
               <a:rPr lang="en-IE" smtClean="0"/>
-              <a:t>25/07/2014</a:t>
+              <a:t>01/08/2014</a:t>
             </a:fld>
             <a:endParaRPr lang="en-IE"/>
           </a:p>
@@ -1882,7 +1882,7 @@
           <a:p>
             <a:fld id="{9FE61444-4E6E-4CEE-8736-B00447B90B41}" type="datetimeFigureOut">
               <a:rPr lang="en-IE" smtClean="0"/>
-              <a:t>25/07/2014</a:t>
+              <a:t>01/08/2014</a:t>
             </a:fld>
             <a:endParaRPr lang="en-IE"/>
           </a:p>
@@ -1977,7 +1977,7 @@
           <a:p>
             <a:fld id="{9FE61444-4E6E-4CEE-8736-B00447B90B41}" type="datetimeFigureOut">
               <a:rPr lang="en-IE" smtClean="0"/>
-              <a:t>25/07/2014</a:t>
+              <a:t>01/08/2014</a:t>
             </a:fld>
             <a:endParaRPr lang="en-IE"/>
           </a:p>
@@ -2254,7 +2254,7 @@
           <a:p>
             <a:fld id="{9FE61444-4E6E-4CEE-8736-B00447B90B41}" type="datetimeFigureOut">
               <a:rPr lang="en-IE" smtClean="0"/>
-              <a:t>25/07/2014</a:t>
+              <a:t>01/08/2014</a:t>
             </a:fld>
             <a:endParaRPr lang="en-IE"/>
           </a:p>
@@ -2507,7 +2507,7 @@
           <a:p>
             <a:fld id="{9FE61444-4E6E-4CEE-8736-B00447B90B41}" type="datetimeFigureOut">
               <a:rPr lang="en-IE" smtClean="0"/>
-              <a:t>25/07/2014</a:t>
+              <a:t>01/08/2014</a:t>
             </a:fld>
             <a:endParaRPr lang="en-IE"/>
           </a:p>
@@ -2720,7 +2720,7 @@
           <a:p>
             <a:fld id="{9FE61444-4E6E-4CEE-8736-B00447B90B41}" type="datetimeFigureOut">
               <a:rPr lang="en-IE" smtClean="0"/>
-              <a:t>25/07/2014</a:t>
+              <a:t>01/08/2014</a:t>
             </a:fld>
             <a:endParaRPr lang="en-IE"/>
           </a:p>
@@ -3115,7 +3115,7 @@
         <p:spPr>
           <a:xfrm>
             <a:off x="539552" y="332656"/>
-            <a:ext cx="7920880" cy="6048672"/>
+            <a:ext cx="7920880" cy="6408712"/>
           </a:xfrm>
           <a:prstGeom prst="rect">
             <a:avLst/>
@@ -3156,7 +3156,7 @@
       </p:sp>
       <p:pic>
         <p:nvPicPr>
-          <p:cNvPr id="1028" name="Picture 4"/>
+          <p:cNvPr id="1026" name="Picture 2"/>
           <p:cNvPicPr>
             <a:picLocks noChangeAspect="1" noChangeArrowheads="1"/>
           </p:cNvPicPr>
@@ -3177,8 +3177,8 @@
         </p:blipFill>
         <p:spPr bwMode="auto">
           <a:xfrm>
-            <a:off x="969518" y="423445"/>
-            <a:ext cx="7204963" cy="5845646"/>
+            <a:off x="1160656" y="374699"/>
+            <a:ext cx="6678672" cy="6126120"/>
           </a:xfrm>
           <a:prstGeom prst="rect">
             <a:avLst/>
@@ -3216,7 +3216,7 @@
         </p:nvSpPr>
         <p:spPr>
           <a:xfrm>
-            <a:off x="3525880" y="5867980"/>
+            <a:off x="3525880" y="6228020"/>
             <a:ext cx="2164247" cy="369332"/>
           </a:xfrm>
           <a:prstGeom prst="rect">
@@ -3246,7 +3246,7 @@
         </p:nvSpPr>
         <p:spPr>
           <a:xfrm rot="16200000">
-            <a:off x="-273169" y="3161602"/>
+            <a:off x="-138446" y="3161602"/>
             <a:ext cx="2138791" cy="369332"/>
           </a:xfrm>
           <a:prstGeom prst="rect">
@@ -3354,7 +3354,6 @@
               <a:rPr lang="en-IE" b="1" dirty="0"/>
               <a:t>C</a:t>
             </a:r>
-            <a:endParaRPr lang="en-IE" b="1" dirty="0"/>
           </a:p>
         </p:txBody>
       </p:sp>
@@ -3384,14 +3383,13 @@
               <a:rPr lang="en-IE" b="1" dirty="0"/>
               <a:t>D</a:t>
             </a:r>
-            <a:endParaRPr lang="en-IE" b="1" dirty="0"/>
           </a:p>
         </p:txBody>
       </p:sp>
     </p:spTree>
     <p:extLst>
       <p:ext uri="{BB962C8B-B14F-4D97-AF65-F5344CB8AC3E}">
-        <p14:creationId xmlns:p14="http://schemas.microsoft.com/office/powerpoint/2010/main" val="3142965464"/>
+        <p14:creationId xmlns:p14="http://schemas.microsoft.com/office/powerpoint/2010/main" val="49807652"/>
       </p:ext>
     </p:extLst>
   </p:cSld>

</xml_diff>